<commit_message>
zerar lista de musicas
</commit_message>
<xml_diff>
--- a/arquivos/ArquivoPronto.pptx
+++ b/arquivos/ArquivoPronto.pptx
@@ -7,9 +7,15 @@
   <p:sldIdLst>
     <p:sldId id="256" r:id="rId2"/>
     <p:sldId id="257" r:id="rId3"/>
+    <p:sldId id="258" r:id="rId4"/>
+    <p:sldId id="259" r:id="rId5"/>
+    <p:sldId id="260" r:id="rId6"/>
+    <p:sldId id="261" r:id="rId7"/>
+    <p:sldId id="262" r:id="rId8"/>
+    <p:sldId id="263" r:id="rId9"/>
   </p:sldIdLst>
   <p:notesMasterIdLst>
-    <p:notesMasterId r:id="rId4"/>
+    <p:notesMasterId r:id="rId10"/>
   </p:notesMasterIdLst>
   <p:sldSz cx="9144000" cy="5143500"/>
   <p:notesSz cx="5143500" cy="9144000"/>
@@ -615,6 +621,534 @@
             <a:fld id="{F7021451-1387-4CA6-816F-3879F97B5CBC}" type="slidenum">
               <a:rPr lang="en-US"/>
               <a:t>2</a:t>
+            </a:fld>
+            <a:endParaRPr lang="en-US"/>
+          </a:p>
+        </p:txBody>
+      </p:sp>
+    </p:spTree>
+    <p:extLst>
+      <p:ext uri="{BB962C8B-B14F-4D97-AF65-F5344CB8AC3E}">
+        <p14:creationId xmlns:p14="http://schemas.microsoft.com/office/powerpoint/2010/main" val="1024086991"/>
+      </p:ext>
+    </p:extLst>
+  </p:cSld>
+  <p:clrMapOvr>
+    <a:masterClrMapping/>
+  </p:clrMapOvr>
+</p:notes>
+</file>
+
+<file path=ppt/notesSlides/notesSlide3.xml><?xml version="1.0" encoding="utf-8"?>
+<p:notes xmlns:a="http://schemas.openxmlformats.org/drawingml/2006/main" xmlns:r="http://schemas.openxmlformats.org/officeDocument/2006/relationships" xmlns:p="http://schemas.openxmlformats.org/presentationml/2006/main">
+  <p:cSld>
+    <p:spTree>
+      <p:nvGrpSpPr>
+        <p:cNvPr id="1" name=""/>
+        <p:cNvGrpSpPr/>
+        <p:nvPr/>
+      </p:nvGrpSpPr>
+      <p:grpSpPr>
+        <a:xfrm>
+          <a:off x="0" y="0"/>
+          <a:ext cx="0" cy="0"/>
+          <a:chOff x="0" y="0"/>
+          <a:chExt cx="0" cy="0"/>
+        </a:xfrm>
+      </p:grpSpPr>
+      <p:sp>
+        <p:nvSpPr>
+          <p:cNvPr id="2" name="Slide Image Placeholder 1"/>
+          <p:cNvSpPr>
+            <a:spLocks noGrp="1" noRot="1" noChangeAspect="1"/>
+          </p:cNvSpPr>
+          <p:nvPr>
+            <p:ph type="sldImg"/>
+          </p:nvPr>
+        </p:nvSpPr>
+        <p:spPr/>
+      </p:sp>
+      <p:sp>
+        <p:nvSpPr>
+          <p:cNvPr id="3" name="Notes Placeholder 2"/>
+          <p:cNvSpPr>
+            <a:spLocks noGrp="1"/>
+          </p:cNvSpPr>
+          <p:nvPr>
+            <p:ph type="body" idx="1"/>
+          </p:nvPr>
+        </p:nvSpPr>
+        <p:spPr/>
+        <p:txBody>
+          <a:bodyPr/>
+          <a:lstStyle/>
+          <a:p>
+            <a:r>
+              <a:rPr lang="en-US" dirty="0"/>
+              <a:t/>
+            </a:r>
+            <a:endParaRPr lang="en-US" dirty="0"/>
+          </a:p>
+        </p:txBody>
+      </p:sp>
+      <p:sp>
+        <p:nvSpPr>
+          <p:cNvPr id="4" name="Slide Number Placeholder 3"/>
+          <p:cNvSpPr>
+            <a:spLocks noGrp="1"/>
+          </p:cNvSpPr>
+          <p:nvPr>
+            <p:ph type="sldNum" sz="quarter" idx="10"/>
+          </p:nvPr>
+        </p:nvSpPr>
+        <p:spPr/>
+        <p:txBody>
+          <a:bodyPr/>
+          <a:lstStyle/>
+          <a:p>
+            <a:fld id="{F7021451-1387-4CA6-816F-3879F97B5CBC}" type="slidenum">
+              <a:rPr lang="en-US"/>
+              <a:t>3</a:t>
+            </a:fld>
+            <a:endParaRPr lang="en-US"/>
+          </a:p>
+        </p:txBody>
+      </p:sp>
+    </p:spTree>
+    <p:extLst>
+      <p:ext uri="{BB962C8B-B14F-4D97-AF65-F5344CB8AC3E}">
+        <p14:creationId xmlns:p14="http://schemas.microsoft.com/office/powerpoint/2010/main" val="1024086991"/>
+      </p:ext>
+    </p:extLst>
+  </p:cSld>
+  <p:clrMapOvr>
+    <a:masterClrMapping/>
+  </p:clrMapOvr>
+</p:notes>
+</file>
+
+<file path=ppt/notesSlides/notesSlide4.xml><?xml version="1.0" encoding="utf-8"?>
+<p:notes xmlns:a="http://schemas.openxmlformats.org/drawingml/2006/main" xmlns:r="http://schemas.openxmlformats.org/officeDocument/2006/relationships" xmlns:p="http://schemas.openxmlformats.org/presentationml/2006/main">
+  <p:cSld>
+    <p:spTree>
+      <p:nvGrpSpPr>
+        <p:cNvPr id="1" name=""/>
+        <p:cNvGrpSpPr/>
+        <p:nvPr/>
+      </p:nvGrpSpPr>
+      <p:grpSpPr>
+        <a:xfrm>
+          <a:off x="0" y="0"/>
+          <a:ext cx="0" cy="0"/>
+          <a:chOff x="0" y="0"/>
+          <a:chExt cx="0" cy="0"/>
+        </a:xfrm>
+      </p:grpSpPr>
+      <p:sp>
+        <p:nvSpPr>
+          <p:cNvPr id="2" name="Slide Image Placeholder 1"/>
+          <p:cNvSpPr>
+            <a:spLocks noGrp="1" noRot="1" noChangeAspect="1"/>
+          </p:cNvSpPr>
+          <p:nvPr>
+            <p:ph type="sldImg"/>
+          </p:nvPr>
+        </p:nvSpPr>
+        <p:spPr/>
+      </p:sp>
+      <p:sp>
+        <p:nvSpPr>
+          <p:cNvPr id="3" name="Notes Placeholder 2"/>
+          <p:cNvSpPr>
+            <a:spLocks noGrp="1"/>
+          </p:cNvSpPr>
+          <p:nvPr>
+            <p:ph type="body" idx="1"/>
+          </p:nvPr>
+        </p:nvSpPr>
+        <p:spPr/>
+        <p:txBody>
+          <a:bodyPr/>
+          <a:lstStyle/>
+          <a:p>
+            <a:r>
+              <a:rPr lang="en-US" dirty="0"/>
+              <a:t/>
+            </a:r>
+            <a:endParaRPr lang="en-US" dirty="0"/>
+          </a:p>
+        </p:txBody>
+      </p:sp>
+      <p:sp>
+        <p:nvSpPr>
+          <p:cNvPr id="4" name="Slide Number Placeholder 3"/>
+          <p:cNvSpPr>
+            <a:spLocks noGrp="1"/>
+          </p:cNvSpPr>
+          <p:nvPr>
+            <p:ph type="sldNum" sz="quarter" idx="10"/>
+          </p:nvPr>
+        </p:nvSpPr>
+        <p:spPr/>
+        <p:txBody>
+          <a:bodyPr/>
+          <a:lstStyle/>
+          <a:p>
+            <a:fld id="{F7021451-1387-4CA6-816F-3879F97B5CBC}" type="slidenum">
+              <a:rPr lang="en-US"/>
+              <a:t>4</a:t>
+            </a:fld>
+            <a:endParaRPr lang="en-US"/>
+          </a:p>
+        </p:txBody>
+      </p:sp>
+    </p:spTree>
+    <p:extLst>
+      <p:ext uri="{BB962C8B-B14F-4D97-AF65-F5344CB8AC3E}">
+        <p14:creationId xmlns:p14="http://schemas.microsoft.com/office/powerpoint/2010/main" val="1024086991"/>
+      </p:ext>
+    </p:extLst>
+  </p:cSld>
+  <p:clrMapOvr>
+    <a:masterClrMapping/>
+  </p:clrMapOvr>
+</p:notes>
+</file>
+
+<file path=ppt/notesSlides/notesSlide5.xml><?xml version="1.0" encoding="utf-8"?>
+<p:notes xmlns:a="http://schemas.openxmlformats.org/drawingml/2006/main" xmlns:r="http://schemas.openxmlformats.org/officeDocument/2006/relationships" xmlns:p="http://schemas.openxmlformats.org/presentationml/2006/main">
+  <p:cSld>
+    <p:spTree>
+      <p:nvGrpSpPr>
+        <p:cNvPr id="1" name=""/>
+        <p:cNvGrpSpPr/>
+        <p:nvPr/>
+      </p:nvGrpSpPr>
+      <p:grpSpPr>
+        <a:xfrm>
+          <a:off x="0" y="0"/>
+          <a:ext cx="0" cy="0"/>
+          <a:chOff x="0" y="0"/>
+          <a:chExt cx="0" cy="0"/>
+        </a:xfrm>
+      </p:grpSpPr>
+      <p:sp>
+        <p:nvSpPr>
+          <p:cNvPr id="2" name="Slide Image Placeholder 1"/>
+          <p:cNvSpPr>
+            <a:spLocks noGrp="1" noRot="1" noChangeAspect="1"/>
+          </p:cNvSpPr>
+          <p:nvPr>
+            <p:ph type="sldImg"/>
+          </p:nvPr>
+        </p:nvSpPr>
+        <p:spPr/>
+      </p:sp>
+      <p:sp>
+        <p:nvSpPr>
+          <p:cNvPr id="3" name="Notes Placeholder 2"/>
+          <p:cNvSpPr>
+            <a:spLocks noGrp="1"/>
+          </p:cNvSpPr>
+          <p:nvPr>
+            <p:ph type="body" idx="1"/>
+          </p:nvPr>
+        </p:nvSpPr>
+        <p:spPr/>
+        <p:txBody>
+          <a:bodyPr/>
+          <a:lstStyle/>
+          <a:p>
+            <a:r>
+              <a:rPr lang="en-US" dirty="0"/>
+              <a:t/>
+            </a:r>
+            <a:endParaRPr lang="en-US" dirty="0"/>
+          </a:p>
+        </p:txBody>
+      </p:sp>
+      <p:sp>
+        <p:nvSpPr>
+          <p:cNvPr id="4" name="Slide Number Placeholder 3"/>
+          <p:cNvSpPr>
+            <a:spLocks noGrp="1"/>
+          </p:cNvSpPr>
+          <p:nvPr>
+            <p:ph type="sldNum" sz="quarter" idx="10"/>
+          </p:nvPr>
+        </p:nvSpPr>
+        <p:spPr/>
+        <p:txBody>
+          <a:bodyPr/>
+          <a:lstStyle/>
+          <a:p>
+            <a:fld id="{F7021451-1387-4CA6-816F-3879F97B5CBC}" type="slidenum">
+              <a:rPr lang="en-US"/>
+              <a:t>5</a:t>
+            </a:fld>
+            <a:endParaRPr lang="en-US"/>
+          </a:p>
+        </p:txBody>
+      </p:sp>
+    </p:spTree>
+    <p:extLst>
+      <p:ext uri="{BB962C8B-B14F-4D97-AF65-F5344CB8AC3E}">
+        <p14:creationId xmlns:p14="http://schemas.microsoft.com/office/powerpoint/2010/main" val="1024086991"/>
+      </p:ext>
+    </p:extLst>
+  </p:cSld>
+  <p:clrMapOvr>
+    <a:masterClrMapping/>
+  </p:clrMapOvr>
+</p:notes>
+</file>
+
+<file path=ppt/notesSlides/notesSlide6.xml><?xml version="1.0" encoding="utf-8"?>
+<p:notes xmlns:a="http://schemas.openxmlformats.org/drawingml/2006/main" xmlns:r="http://schemas.openxmlformats.org/officeDocument/2006/relationships" xmlns:p="http://schemas.openxmlformats.org/presentationml/2006/main">
+  <p:cSld>
+    <p:spTree>
+      <p:nvGrpSpPr>
+        <p:cNvPr id="1" name=""/>
+        <p:cNvGrpSpPr/>
+        <p:nvPr/>
+      </p:nvGrpSpPr>
+      <p:grpSpPr>
+        <a:xfrm>
+          <a:off x="0" y="0"/>
+          <a:ext cx="0" cy="0"/>
+          <a:chOff x="0" y="0"/>
+          <a:chExt cx="0" cy="0"/>
+        </a:xfrm>
+      </p:grpSpPr>
+      <p:sp>
+        <p:nvSpPr>
+          <p:cNvPr id="2" name="Slide Image Placeholder 1"/>
+          <p:cNvSpPr>
+            <a:spLocks noGrp="1" noRot="1" noChangeAspect="1"/>
+          </p:cNvSpPr>
+          <p:nvPr>
+            <p:ph type="sldImg"/>
+          </p:nvPr>
+        </p:nvSpPr>
+        <p:spPr/>
+      </p:sp>
+      <p:sp>
+        <p:nvSpPr>
+          <p:cNvPr id="3" name="Notes Placeholder 2"/>
+          <p:cNvSpPr>
+            <a:spLocks noGrp="1"/>
+          </p:cNvSpPr>
+          <p:nvPr>
+            <p:ph type="body" idx="1"/>
+          </p:nvPr>
+        </p:nvSpPr>
+        <p:spPr/>
+        <p:txBody>
+          <a:bodyPr/>
+          <a:lstStyle/>
+          <a:p>
+            <a:r>
+              <a:rPr lang="en-US" dirty="0"/>
+              <a:t/>
+            </a:r>
+            <a:endParaRPr lang="en-US" dirty="0"/>
+          </a:p>
+        </p:txBody>
+      </p:sp>
+      <p:sp>
+        <p:nvSpPr>
+          <p:cNvPr id="4" name="Slide Number Placeholder 3"/>
+          <p:cNvSpPr>
+            <a:spLocks noGrp="1"/>
+          </p:cNvSpPr>
+          <p:nvPr>
+            <p:ph type="sldNum" sz="quarter" idx="10"/>
+          </p:nvPr>
+        </p:nvSpPr>
+        <p:spPr/>
+        <p:txBody>
+          <a:bodyPr/>
+          <a:lstStyle/>
+          <a:p>
+            <a:fld id="{F7021451-1387-4CA6-816F-3879F97B5CBC}" type="slidenum">
+              <a:rPr lang="en-US"/>
+              <a:t>6</a:t>
+            </a:fld>
+            <a:endParaRPr lang="en-US"/>
+          </a:p>
+        </p:txBody>
+      </p:sp>
+    </p:spTree>
+    <p:extLst>
+      <p:ext uri="{BB962C8B-B14F-4D97-AF65-F5344CB8AC3E}">
+        <p14:creationId xmlns:p14="http://schemas.microsoft.com/office/powerpoint/2010/main" val="1024086991"/>
+      </p:ext>
+    </p:extLst>
+  </p:cSld>
+  <p:clrMapOvr>
+    <a:masterClrMapping/>
+  </p:clrMapOvr>
+</p:notes>
+</file>
+
+<file path=ppt/notesSlides/notesSlide7.xml><?xml version="1.0" encoding="utf-8"?>
+<p:notes xmlns:a="http://schemas.openxmlformats.org/drawingml/2006/main" xmlns:r="http://schemas.openxmlformats.org/officeDocument/2006/relationships" xmlns:p="http://schemas.openxmlformats.org/presentationml/2006/main">
+  <p:cSld>
+    <p:spTree>
+      <p:nvGrpSpPr>
+        <p:cNvPr id="1" name=""/>
+        <p:cNvGrpSpPr/>
+        <p:nvPr/>
+      </p:nvGrpSpPr>
+      <p:grpSpPr>
+        <a:xfrm>
+          <a:off x="0" y="0"/>
+          <a:ext cx="0" cy="0"/>
+          <a:chOff x="0" y="0"/>
+          <a:chExt cx="0" cy="0"/>
+        </a:xfrm>
+      </p:grpSpPr>
+      <p:sp>
+        <p:nvSpPr>
+          <p:cNvPr id="2" name="Slide Image Placeholder 1"/>
+          <p:cNvSpPr>
+            <a:spLocks noGrp="1" noRot="1" noChangeAspect="1"/>
+          </p:cNvSpPr>
+          <p:nvPr>
+            <p:ph type="sldImg"/>
+          </p:nvPr>
+        </p:nvSpPr>
+        <p:spPr/>
+      </p:sp>
+      <p:sp>
+        <p:nvSpPr>
+          <p:cNvPr id="3" name="Notes Placeholder 2"/>
+          <p:cNvSpPr>
+            <a:spLocks noGrp="1"/>
+          </p:cNvSpPr>
+          <p:nvPr>
+            <p:ph type="body" idx="1"/>
+          </p:nvPr>
+        </p:nvSpPr>
+        <p:spPr/>
+        <p:txBody>
+          <a:bodyPr/>
+          <a:lstStyle/>
+          <a:p>
+            <a:r>
+              <a:rPr lang="en-US" dirty="0"/>
+              <a:t/>
+            </a:r>
+            <a:endParaRPr lang="en-US" dirty="0"/>
+          </a:p>
+        </p:txBody>
+      </p:sp>
+      <p:sp>
+        <p:nvSpPr>
+          <p:cNvPr id="4" name="Slide Number Placeholder 3"/>
+          <p:cNvSpPr>
+            <a:spLocks noGrp="1"/>
+          </p:cNvSpPr>
+          <p:nvPr>
+            <p:ph type="sldNum" sz="quarter" idx="10"/>
+          </p:nvPr>
+        </p:nvSpPr>
+        <p:spPr/>
+        <p:txBody>
+          <a:bodyPr/>
+          <a:lstStyle/>
+          <a:p>
+            <a:fld id="{F7021451-1387-4CA6-816F-3879F97B5CBC}" type="slidenum">
+              <a:rPr lang="en-US"/>
+              <a:t>7</a:t>
+            </a:fld>
+            <a:endParaRPr lang="en-US"/>
+          </a:p>
+        </p:txBody>
+      </p:sp>
+    </p:spTree>
+    <p:extLst>
+      <p:ext uri="{BB962C8B-B14F-4D97-AF65-F5344CB8AC3E}">
+        <p14:creationId xmlns:p14="http://schemas.microsoft.com/office/powerpoint/2010/main" val="1024086991"/>
+      </p:ext>
+    </p:extLst>
+  </p:cSld>
+  <p:clrMapOvr>
+    <a:masterClrMapping/>
+  </p:clrMapOvr>
+</p:notes>
+</file>
+
+<file path=ppt/notesSlides/notesSlide8.xml><?xml version="1.0" encoding="utf-8"?>
+<p:notes xmlns:a="http://schemas.openxmlformats.org/drawingml/2006/main" xmlns:r="http://schemas.openxmlformats.org/officeDocument/2006/relationships" xmlns:p="http://schemas.openxmlformats.org/presentationml/2006/main">
+  <p:cSld>
+    <p:spTree>
+      <p:nvGrpSpPr>
+        <p:cNvPr id="1" name=""/>
+        <p:cNvGrpSpPr/>
+        <p:nvPr/>
+      </p:nvGrpSpPr>
+      <p:grpSpPr>
+        <a:xfrm>
+          <a:off x="0" y="0"/>
+          <a:ext cx="0" cy="0"/>
+          <a:chOff x="0" y="0"/>
+          <a:chExt cx="0" cy="0"/>
+        </a:xfrm>
+      </p:grpSpPr>
+      <p:sp>
+        <p:nvSpPr>
+          <p:cNvPr id="2" name="Slide Image Placeholder 1"/>
+          <p:cNvSpPr>
+            <a:spLocks noGrp="1" noRot="1" noChangeAspect="1"/>
+          </p:cNvSpPr>
+          <p:nvPr>
+            <p:ph type="sldImg"/>
+          </p:nvPr>
+        </p:nvSpPr>
+        <p:spPr/>
+      </p:sp>
+      <p:sp>
+        <p:nvSpPr>
+          <p:cNvPr id="3" name="Notes Placeholder 2"/>
+          <p:cNvSpPr>
+            <a:spLocks noGrp="1"/>
+          </p:cNvSpPr>
+          <p:nvPr>
+            <p:ph type="body" idx="1"/>
+          </p:nvPr>
+        </p:nvSpPr>
+        <p:spPr/>
+        <p:txBody>
+          <a:bodyPr/>
+          <a:lstStyle/>
+          <a:p>
+            <a:r>
+              <a:rPr lang="en-US" dirty="0"/>
+              <a:t/>
+            </a:r>
+            <a:endParaRPr lang="en-US" dirty="0"/>
+          </a:p>
+        </p:txBody>
+      </p:sp>
+      <p:sp>
+        <p:nvSpPr>
+          <p:cNvPr id="4" name="Slide Number Placeholder 3"/>
+          <p:cNvSpPr>
+            <a:spLocks noGrp="1"/>
+          </p:cNvSpPr>
+          <p:nvPr>
+            <p:ph type="sldNum" sz="quarter" idx="10"/>
+          </p:nvPr>
+        </p:nvSpPr>
+        <p:spPr/>
+        <p:txBody>
+          <a:bodyPr/>
+          <a:lstStyle/>
+          <a:p>
+            <a:fld id="{F7021451-1387-4CA6-816F-3879F97B5CBC}" type="slidenum">
+              <a:rPr lang="en-US"/>
+              <a:t>8</a:t>
             </a:fld>
             <a:endParaRPr lang="en-US"/>
           </a:p>
@@ -994,7 +1528,7 @@
                   <a:srgbClr val="FF0000"/>
                 </a:solidFill>
               </a:rPr>
-              <a:t>DEUS TRINO DE AMOR</a:t>
+              <a:t>GLORIA BANDA CIROS</a:t>
             </a:r>
             <a:endParaRPr lang="en-US" sz="2400" dirty="0"/>
           </a:p>
@@ -1032,7 +1566,49 @@
                   <a:srgbClr val="F5FFFA"/>
                 </a:solidFill>
               </a:rPr>
-              <a:t>Estrofe 1: Em nome do Pai, Em nome do Filho, Em nome do Espírito Santo, Estamos aqui</a:t>
+              <a:t>Estrofe 1: Deus e Pai nós vos louvamos</a:t>
+            </a:r>
+            <a:endParaRPr lang="en-US" sz="2400" dirty="0"/>
+          </a:p>
+          <a:p>
+            <a:pPr algn="ctr" indent="0" marL="0">
+              <a:buNone/>
+            </a:pPr>
+            <a:r>
+              <a:rPr lang="en-US" sz="2400" dirty="0">
+                <a:solidFill>
+                  <a:srgbClr val="F5FFFA"/>
+                </a:solidFill>
+              </a:rPr>
+              <a:t>Adoramos, bendizemos</a:t>
+            </a:r>
+            <a:endParaRPr lang="en-US" sz="2400" dirty="0"/>
+          </a:p>
+          <a:p>
+            <a:pPr algn="ctr" indent="0" marL="0">
+              <a:buNone/>
+            </a:pPr>
+            <a:r>
+              <a:rPr lang="en-US" sz="2400" dirty="0">
+                <a:solidFill>
+                  <a:srgbClr val="F5FFFA"/>
+                </a:solidFill>
+              </a:rPr>
+              <a:t>Damos glória ao vosso nome</a:t>
+            </a:r>
+            <a:endParaRPr lang="en-US" sz="2400" dirty="0"/>
+          </a:p>
+          <a:p>
+            <a:pPr algn="ctr" indent="0" marL="0">
+              <a:buNone/>
+            </a:pPr>
+            <a:r>
+              <a:rPr lang="en-US" sz="2400" dirty="0">
+                <a:solidFill>
+                  <a:srgbClr val="F5FFFA"/>
+                </a:solidFill>
+              </a:rPr>
+              <a:t>Vossos dons agradecemos</a:t>
             </a:r>
             <a:endParaRPr lang="en-US" sz="2400" dirty="0"/>
           </a:p>
@@ -1102,7 +1678,673 @@
                   <a:srgbClr val="F5FFFA"/>
                 </a:solidFill>
               </a:rPr>
-              <a:t>Refrão: Para Louvar e agradecer, bendizer e adorar, estamos aqui Senhor, ao seu dispor. Para Louvar e agradecer, bendizer e exaltar, te aclamar, deus trino de amor</a:t>
+              <a:t>Refrão: Glória, glória a Deus no céu e paz na Terra</a:t>
+            </a:r>
+            <a:endParaRPr lang="en-US" sz="2400" dirty="0"/>
+          </a:p>
+        </p:txBody>
+      </p:sp>
+    </p:spTree>
+  </p:cSld>
+  <p:clrMapOvr>
+    <a:masterClrMapping/>
+  </p:clrMapOvr>
+</p:sld>
+</file>
+
+<file path=ppt/slides/slide3.xml><?xml version="1.0" encoding="utf-8"?>
+<p:sld xmlns:a="http://schemas.openxmlformats.org/drawingml/2006/main" xmlns:r="http://schemas.openxmlformats.org/officeDocument/2006/relationships" xmlns:p="http://schemas.openxmlformats.org/presentationml/2006/main">
+  <p:cSld name="Slide 3">
+    <p:bg>
+      <p:bgPr>
+        <a:solidFill>
+          <a:srgbClr val="000000"/>
+        </a:solidFill>
+      </p:bgPr>
+    </p:bg>
+    <p:spTree>
+      <p:nvGrpSpPr>
+        <p:cNvPr id="1" name=""/>
+        <p:cNvGrpSpPr/>
+        <p:nvPr/>
+      </p:nvGrpSpPr>
+      <p:grpSpPr>
+        <a:xfrm>
+          <a:off x="0" y="0"/>
+          <a:ext cx="0" cy="0"/>
+          <a:chOff x="0" y="0"/>
+          <a:chExt cx="0" cy="0"/>
+        </a:xfrm>
+      </p:grpSpPr>
+      <p:sp>
+        <p:nvSpPr>
+          <p:cNvPr id="2" name="Text 0"/>
+          <p:cNvSpPr/>
+          <p:nvPr/>
+        </p:nvSpPr>
+        <p:spPr>
+          <a:xfrm>
+            <a:off x="1371600" y="2286000"/>
+            <a:ext cx="6858000" cy="0"/>
+          </a:xfrm>
+          <a:prstGeom prst="rect">
+            <a:avLst/>
+          </a:prstGeom>
+          <a:solidFill>
+            <a:srgbClr val="F1F1F1"/>
+          </a:solidFill>
+          <a:ln/>
+        </p:spPr>
+        <p:txBody>
+          <a:bodyPr wrap="square" rtlCol="0" anchor="ctr"/>
+          <a:lstStyle/>
+          <a:p>
+            <a:pPr algn="ctr" indent="0" marL="0">
+              <a:buNone/>
+            </a:pPr>
+            <a:r>
+              <a:rPr lang="en-US" sz="2400" dirty="0">
+                <a:solidFill>
+                  <a:srgbClr val="F5FFFA"/>
+                </a:solidFill>
+              </a:rPr>
+              <a:t>Estrofe 2: Senhor nosso Jesus Cristo</a:t>
+            </a:r>
+            <a:endParaRPr lang="en-US" sz="2400" dirty="0"/>
+          </a:p>
+          <a:p>
+            <a:pPr algn="ctr" indent="0" marL="0">
+              <a:buNone/>
+            </a:pPr>
+            <a:r>
+              <a:rPr lang="en-US" sz="2400" dirty="0">
+                <a:solidFill>
+                  <a:srgbClr val="F5FFFA"/>
+                </a:solidFill>
+              </a:rPr>
+              <a:t>Unigênito do Pai</a:t>
+            </a:r>
+            <a:endParaRPr lang="en-US" sz="2400" dirty="0"/>
+          </a:p>
+          <a:p>
+            <a:pPr algn="ctr" indent="0" marL="0">
+              <a:buNone/>
+            </a:pPr>
+            <a:r>
+              <a:rPr lang="en-US" sz="2400" dirty="0">
+                <a:solidFill>
+                  <a:srgbClr val="F5FFFA"/>
+                </a:solidFill>
+              </a:rPr>
+              <a:t>Voz de Deus, Cordeiro Santo</a:t>
+            </a:r>
+            <a:endParaRPr lang="en-US" sz="2400" dirty="0"/>
+          </a:p>
+          <a:p>
+            <a:pPr algn="ctr" indent="0" marL="0">
+              <a:buNone/>
+            </a:pPr>
+            <a:r>
+              <a:rPr lang="en-US" sz="2400" dirty="0">
+                <a:solidFill>
+                  <a:srgbClr val="F5FFFA"/>
+                </a:solidFill>
+              </a:rPr>
+              <a:t>Nossas culpas perdoai</a:t>
+            </a:r>
+            <a:endParaRPr lang="en-US" sz="2400" dirty="0"/>
+          </a:p>
+        </p:txBody>
+      </p:sp>
+    </p:spTree>
+  </p:cSld>
+  <p:clrMapOvr>
+    <a:masterClrMapping/>
+  </p:clrMapOvr>
+</p:sld>
+</file>
+
+<file path=ppt/slides/slide4.xml><?xml version="1.0" encoding="utf-8"?>
+<p:sld xmlns:a="http://schemas.openxmlformats.org/drawingml/2006/main" xmlns:r="http://schemas.openxmlformats.org/officeDocument/2006/relationships" xmlns:p="http://schemas.openxmlformats.org/presentationml/2006/main">
+  <p:cSld name="Slide 4">
+    <p:bg>
+      <p:bgPr>
+        <a:solidFill>
+          <a:srgbClr val="000000"/>
+        </a:solidFill>
+      </p:bgPr>
+    </p:bg>
+    <p:spTree>
+      <p:nvGrpSpPr>
+        <p:cNvPr id="1" name=""/>
+        <p:cNvGrpSpPr/>
+        <p:nvPr/>
+      </p:nvGrpSpPr>
+      <p:grpSpPr>
+        <a:xfrm>
+          <a:off x="0" y="0"/>
+          <a:ext cx="0" cy="0"/>
+          <a:chOff x="0" y="0"/>
+          <a:chExt cx="0" cy="0"/>
+        </a:xfrm>
+      </p:grpSpPr>
+      <p:sp>
+        <p:nvSpPr>
+          <p:cNvPr id="2" name="Text 0"/>
+          <p:cNvSpPr/>
+          <p:nvPr/>
+        </p:nvSpPr>
+        <p:spPr>
+          <a:xfrm>
+            <a:off x="1371600" y="2286000"/>
+            <a:ext cx="6858000" cy="0"/>
+          </a:xfrm>
+          <a:prstGeom prst="rect">
+            <a:avLst/>
+          </a:prstGeom>
+          <a:solidFill>
+            <a:srgbClr val="F1F1F1"/>
+          </a:solidFill>
+          <a:ln/>
+        </p:spPr>
+        <p:txBody>
+          <a:bodyPr wrap="square" rtlCol="0" anchor="ctr"/>
+          <a:lstStyle/>
+          <a:p>
+            <a:pPr algn="ctr" indent="0" marL="0">
+              <a:buNone/>
+            </a:pPr>
+            <a:r>
+              <a:rPr lang="en-US" sz="2400" dirty="0">
+                <a:solidFill>
+                  <a:srgbClr val="F5FFFA"/>
+                </a:solidFill>
+              </a:rPr>
+              <a:t>Refrão: Glória, glória a Deus no céu e paz na Terra</a:t>
+            </a:r>
+            <a:endParaRPr lang="en-US" sz="2400" dirty="0"/>
+          </a:p>
+        </p:txBody>
+      </p:sp>
+    </p:spTree>
+  </p:cSld>
+  <p:clrMapOvr>
+    <a:masterClrMapping/>
+  </p:clrMapOvr>
+</p:sld>
+</file>
+
+<file path=ppt/slides/slide5.xml><?xml version="1.0" encoding="utf-8"?>
+<p:sld xmlns:a="http://schemas.openxmlformats.org/drawingml/2006/main" xmlns:r="http://schemas.openxmlformats.org/officeDocument/2006/relationships" xmlns:p="http://schemas.openxmlformats.org/presentationml/2006/main">
+  <p:cSld name="Slide 5">
+    <p:bg>
+      <p:bgPr>
+        <a:solidFill>
+          <a:srgbClr val="000000"/>
+        </a:solidFill>
+      </p:bgPr>
+    </p:bg>
+    <p:spTree>
+      <p:nvGrpSpPr>
+        <p:cNvPr id="1" name=""/>
+        <p:cNvGrpSpPr/>
+        <p:nvPr/>
+      </p:nvGrpSpPr>
+      <p:grpSpPr>
+        <a:xfrm>
+          <a:off x="0" y="0"/>
+          <a:ext cx="0" cy="0"/>
+          <a:chOff x="0" y="0"/>
+          <a:chExt cx="0" cy="0"/>
+        </a:xfrm>
+      </p:grpSpPr>
+      <p:sp>
+        <p:nvSpPr>
+          <p:cNvPr id="2" name="Text 0"/>
+          <p:cNvSpPr/>
+          <p:nvPr/>
+        </p:nvSpPr>
+        <p:spPr>
+          <a:xfrm>
+            <a:off x="1371600" y="457200"/>
+            <a:ext cx="6858000" cy="0"/>
+          </a:xfrm>
+          <a:prstGeom prst="rect">
+            <a:avLst/>
+          </a:prstGeom>
+          <a:noFill/>
+          <a:ln/>
+        </p:spPr>
+        <p:txBody>
+          <a:bodyPr wrap="square" rtlCol="0" anchor="ctr"/>
+          <a:lstStyle/>
+          <a:p>
+            <a:pPr algn="ctr" indent="0" marL="0">
+              <a:buNone/>
+            </a:pPr>
+            <a:r>
+              <a:rPr lang="en-US" sz="2400" dirty="0">
+                <a:solidFill>
+                  <a:srgbClr val="FF0000"/>
+                </a:solidFill>
+              </a:rPr>
+              <a:t>UM CORAÇÃO PARA AMAR</a:t>
+            </a:r>
+            <a:endParaRPr lang="en-US" sz="2400" dirty="0"/>
+          </a:p>
+        </p:txBody>
+      </p:sp>
+      <p:sp>
+        <p:nvSpPr>
+          <p:cNvPr id="3" name="Text 1"/>
+          <p:cNvSpPr/>
+          <p:nvPr/>
+        </p:nvSpPr>
+        <p:spPr>
+          <a:xfrm>
+            <a:off x="1371600" y="2286000"/>
+            <a:ext cx="6858000" cy="0"/>
+          </a:xfrm>
+          <a:prstGeom prst="rect">
+            <a:avLst/>
+          </a:prstGeom>
+          <a:solidFill>
+            <a:srgbClr val="F1F1F1"/>
+          </a:solidFill>
+          <a:ln/>
+        </p:spPr>
+        <p:txBody>
+          <a:bodyPr wrap="square" rtlCol="0" anchor="ctr"/>
+          <a:lstStyle/>
+          <a:p>
+            <a:pPr algn="ctr" indent="0" marL="0">
+              <a:buNone/>
+            </a:pPr>
+            <a:r>
+              <a:rPr lang="en-US" sz="2400" dirty="0">
+                <a:solidFill>
+                  <a:srgbClr val="F5FFFA"/>
+                </a:solidFill>
+              </a:rPr>
+              <a:t>Estrofe 1: Um coração para amar, pra perdoar e sentir</a:t>
+            </a:r>
+            <a:endParaRPr lang="en-US" sz="2400" dirty="0"/>
+          </a:p>
+          <a:p>
+            <a:pPr algn="ctr" indent="0" marL="0">
+              <a:buNone/>
+            </a:pPr>
+            <a:r>
+              <a:rPr lang="en-US" sz="2400" dirty="0">
+                <a:solidFill>
+                  <a:srgbClr val="F5FFFA"/>
+                </a:solidFill>
+              </a:rPr>
+              <a:t>Para chorar e sorrir, ao me criar Tu me destes</a:t>
+            </a:r>
+            <a:endParaRPr lang="en-US" sz="2400" dirty="0"/>
+          </a:p>
+          <a:p>
+            <a:pPr algn="ctr" indent="0" marL="0">
+              <a:buNone/>
+            </a:pPr>
+            <a:r>
+              <a:rPr lang="en-US" sz="2400" dirty="0">
+                <a:solidFill>
+                  <a:srgbClr val="F5FFFA"/>
+                </a:solidFill>
+              </a:rPr>
+              <a:t>Um coração pra sonhar, inquieto e sempre a bater</a:t>
+            </a:r>
+            <a:endParaRPr lang="en-US" sz="2400" dirty="0"/>
+          </a:p>
+          <a:p>
+            <a:pPr algn="ctr" indent="0" marL="0">
+              <a:buNone/>
+            </a:pPr>
+            <a:r>
+              <a:rPr lang="en-US" sz="2400" dirty="0">
+                <a:solidFill>
+                  <a:srgbClr val="F5FFFA"/>
+                </a:solidFill>
+              </a:rPr>
+              <a:t>Ansioso por entender as coisas que Tu disseste</a:t>
+            </a:r>
+            <a:endParaRPr lang="en-US" sz="2400" dirty="0"/>
+          </a:p>
+        </p:txBody>
+      </p:sp>
+    </p:spTree>
+  </p:cSld>
+  <p:clrMapOvr>
+    <a:masterClrMapping/>
+  </p:clrMapOvr>
+</p:sld>
+</file>
+
+<file path=ppt/slides/slide6.xml><?xml version="1.0" encoding="utf-8"?>
+<p:sld xmlns:a="http://schemas.openxmlformats.org/drawingml/2006/main" xmlns:r="http://schemas.openxmlformats.org/officeDocument/2006/relationships" xmlns:p="http://schemas.openxmlformats.org/presentationml/2006/main">
+  <p:cSld name="Slide 6">
+    <p:bg>
+      <p:bgPr>
+        <a:solidFill>
+          <a:srgbClr val="000000"/>
+        </a:solidFill>
+      </p:bgPr>
+    </p:bg>
+    <p:spTree>
+      <p:nvGrpSpPr>
+        <p:cNvPr id="1" name=""/>
+        <p:cNvGrpSpPr/>
+        <p:nvPr/>
+      </p:nvGrpSpPr>
+      <p:grpSpPr>
+        <a:xfrm>
+          <a:off x="0" y="0"/>
+          <a:ext cx="0" cy="0"/>
+          <a:chOff x="0" y="0"/>
+          <a:chExt cx="0" cy="0"/>
+        </a:xfrm>
+      </p:grpSpPr>
+      <p:sp>
+        <p:nvSpPr>
+          <p:cNvPr id="2" name="Text 0"/>
+          <p:cNvSpPr/>
+          <p:nvPr/>
+        </p:nvSpPr>
+        <p:spPr>
+          <a:xfrm>
+            <a:off x="1371600" y="2286000"/>
+            <a:ext cx="6858000" cy="0"/>
+          </a:xfrm>
+          <a:prstGeom prst="rect">
+            <a:avLst/>
+          </a:prstGeom>
+          <a:solidFill>
+            <a:srgbClr val="F1F1F1"/>
+          </a:solidFill>
+          <a:ln/>
+        </p:spPr>
+        <p:txBody>
+          <a:bodyPr wrap="square" rtlCol="0" anchor="ctr"/>
+          <a:lstStyle/>
+          <a:p>
+            <a:pPr algn="ctr" indent="0" marL="0">
+              <a:buNone/>
+            </a:pPr>
+            <a:r>
+              <a:rPr lang="en-US" sz="2400" dirty="0">
+                <a:solidFill>
+                  <a:srgbClr val="F5FFFA"/>
+                </a:solidFill>
+              </a:rPr>
+              <a:t>Refrão: Eis o que eu venho Te dar</a:t>
+            </a:r>
+            <a:endParaRPr lang="en-US" sz="2400" dirty="0"/>
+          </a:p>
+          <a:p>
+            <a:pPr algn="ctr" indent="0" marL="0">
+              <a:buNone/>
+            </a:pPr>
+            <a:r>
+              <a:rPr lang="en-US" sz="2400" dirty="0">
+                <a:solidFill>
+                  <a:srgbClr val="F5FFFA"/>
+                </a:solidFill>
+              </a:rPr>
+              <a:t>Eis o que eu ponho no altar</a:t>
+            </a:r>
+            <a:endParaRPr lang="en-US" sz="2400" dirty="0"/>
+          </a:p>
+          <a:p>
+            <a:pPr algn="ctr" indent="0" marL="0">
+              <a:buNone/>
+            </a:pPr>
+            <a:r>
+              <a:rPr lang="en-US" sz="2400" dirty="0">
+                <a:solidFill>
+                  <a:srgbClr val="F5FFFA"/>
+                </a:solidFill>
+              </a:rPr>
+              <a:t>Toma, Senhor, que ele é Teu</a:t>
+            </a:r>
+            <a:endParaRPr lang="en-US" sz="2400" dirty="0"/>
+          </a:p>
+          <a:p>
+            <a:pPr algn="ctr" indent="0" marL="0">
+              <a:buNone/>
+            </a:pPr>
+            <a:r>
+              <a:rPr lang="en-US" sz="2400" dirty="0">
+                <a:solidFill>
+                  <a:srgbClr val="F5FFFA"/>
+                </a:solidFill>
+              </a:rPr>
+              <a:t>Meu coração não é meu</a:t>
+            </a:r>
+            <a:endParaRPr lang="en-US" sz="2400" dirty="0"/>
+          </a:p>
+        </p:txBody>
+      </p:sp>
+    </p:spTree>
+  </p:cSld>
+  <p:clrMapOvr>
+    <a:masterClrMapping/>
+  </p:clrMapOvr>
+</p:sld>
+</file>
+
+<file path=ppt/slides/slide7.xml><?xml version="1.0" encoding="utf-8"?>
+<p:sld xmlns:a="http://schemas.openxmlformats.org/drawingml/2006/main" xmlns:r="http://schemas.openxmlformats.org/officeDocument/2006/relationships" xmlns:p="http://schemas.openxmlformats.org/presentationml/2006/main">
+  <p:cSld name="Slide 7">
+    <p:bg>
+      <p:bgPr>
+        <a:solidFill>
+          <a:srgbClr val="000000"/>
+        </a:solidFill>
+      </p:bgPr>
+    </p:bg>
+    <p:spTree>
+      <p:nvGrpSpPr>
+        <p:cNvPr id="1" name=""/>
+        <p:cNvGrpSpPr/>
+        <p:nvPr/>
+      </p:nvGrpSpPr>
+      <p:grpSpPr>
+        <a:xfrm>
+          <a:off x="0" y="0"/>
+          <a:ext cx="0" cy="0"/>
+          <a:chOff x="0" y="0"/>
+          <a:chExt cx="0" cy="0"/>
+        </a:xfrm>
+      </p:grpSpPr>
+      <p:sp>
+        <p:nvSpPr>
+          <p:cNvPr id="2" name="Text 0"/>
+          <p:cNvSpPr/>
+          <p:nvPr/>
+        </p:nvSpPr>
+        <p:spPr>
+          <a:xfrm>
+            <a:off x="1371600" y="2286000"/>
+            <a:ext cx="6858000" cy="0"/>
+          </a:xfrm>
+          <a:prstGeom prst="rect">
+            <a:avLst/>
+          </a:prstGeom>
+          <a:solidFill>
+            <a:srgbClr val="F1F1F1"/>
+          </a:solidFill>
+          <a:ln/>
+        </p:spPr>
+        <p:txBody>
+          <a:bodyPr wrap="square" rtlCol="0" anchor="ctr"/>
+          <a:lstStyle/>
+          <a:p>
+            <a:pPr algn="ctr" indent="0" marL="0">
+              <a:buNone/>
+            </a:pPr>
+            <a:r>
+              <a:rPr lang="en-US" sz="2400" dirty="0">
+                <a:solidFill>
+                  <a:srgbClr val="F5FFFA"/>
+                </a:solidFill>
+              </a:rPr>
+              <a:t>Estrofe 2: Quero que o meu coração seja tão cheio de paz</a:t>
+            </a:r>
+            <a:endParaRPr lang="en-US" sz="2400" dirty="0"/>
+          </a:p>
+          <a:p>
+            <a:pPr algn="ctr" indent="0" marL="0">
+              <a:buNone/>
+            </a:pPr>
+            <a:r>
+              <a:rPr lang="en-US" sz="2400" dirty="0">
+                <a:solidFill>
+                  <a:srgbClr val="F5FFFA"/>
+                </a:solidFill>
+              </a:rPr>
+              <a:t>Que não se sinta capaz de sentir ódio ou rancor</a:t>
+            </a:r>
+            <a:endParaRPr lang="en-US" sz="2400" dirty="0"/>
+          </a:p>
+          <a:p>
+            <a:pPr algn="ctr" indent="0" marL="0">
+              <a:buNone/>
+            </a:pPr>
+            <a:r>
+              <a:rPr lang="en-US" sz="2400" dirty="0">
+                <a:solidFill>
+                  <a:srgbClr val="F5FFFA"/>
+                </a:solidFill>
+              </a:rPr>
+              <a:t>Quero que a minha oração possa me amadurecer</a:t>
+            </a:r>
+            <a:endParaRPr lang="en-US" sz="2400" dirty="0"/>
+          </a:p>
+          <a:p>
+            <a:pPr algn="ctr" indent="0" marL="0">
+              <a:buNone/>
+            </a:pPr>
+            <a:r>
+              <a:rPr lang="en-US" sz="2400" dirty="0">
+                <a:solidFill>
+                  <a:srgbClr val="F5FFFA"/>
+                </a:solidFill>
+              </a:rPr>
+              <a:t>Leve-me a compreender as consequências do amor</a:t>
+            </a:r>
+            <a:endParaRPr lang="en-US" sz="2400" dirty="0"/>
+          </a:p>
+        </p:txBody>
+      </p:sp>
+    </p:spTree>
+  </p:cSld>
+  <p:clrMapOvr>
+    <a:masterClrMapping/>
+  </p:clrMapOvr>
+</p:sld>
+</file>
+
+<file path=ppt/slides/slide8.xml><?xml version="1.0" encoding="utf-8"?>
+<p:sld xmlns:a="http://schemas.openxmlformats.org/drawingml/2006/main" xmlns:r="http://schemas.openxmlformats.org/officeDocument/2006/relationships" xmlns:p="http://schemas.openxmlformats.org/presentationml/2006/main">
+  <p:cSld name="Slide 8">
+    <p:bg>
+      <p:bgPr>
+        <a:solidFill>
+          <a:srgbClr val="000000"/>
+        </a:solidFill>
+      </p:bgPr>
+    </p:bg>
+    <p:spTree>
+      <p:nvGrpSpPr>
+        <p:cNvPr id="1" name=""/>
+        <p:cNvGrpSpPr/>
+        <p:nvPr/>
+      </p:nvGrpSpPr>
+      <p:grpSpPr>
+        <a:xfrm>
+          <a:off x="0" y="0"/>
+          <a:ext cx="0" cy="0"/>
+          <a:chOff x="0" y="0"/>
+          <a:chExt cx="0" cy="0"/>
+        </a:xfrm>
+      </p:grpSpPr>
+      <p:sp>
+        <p:nvSpPr>
+          <p:cNvPr id="2" name="Text 0"/>
+          <p:cNvSpPr/>
+          <p:nvPr/>
+        </p:nvSpPr>
+        <p:spPr>
+          <a:xfrm>
+            <a:off x="1371600" y="2286000"/>
+            <a:ext cx="6858000" cy="0"/>
+          </a:xfrm>
+          <a:prstGeom prst="rect">
+            <a:avLst/>
+          </a:prstGeom>
+          <a:solidFill>
+            <a:srgbClr val="F1F1F1"/>
+          </a:solidFill>
+          <a:ln/>
+        </p:spPr>
+        <p:txBody>
+          <a:bodyPr wrap="square" rtlCol="0" anchor="ctr"/>
+          <a:lstStyle/>
+          <a:p>
+            <a:pPr algn="ctr" indent="0" marL="0">
+              <a:buNone/>
+            </a:pPr>
+            <a:r>
+              <a:rPr lang="en-US" sz="2400" dirty="0">
+                <a:solidFill>
+                  <a:srgbClr val="F5FFFA"/>
+                </a:solidFill>
+              </a:rPr>
+              <a:t>Refrão: Eis o que eu venho Te dar</a:t>
+            </a:r>
+            <a:endParaRPr lang="en-US" sz="2400" dirty="0"/>
+          </a:p>
+          <a:p>
+            <a:pPr algn="ctr" indent="0" marL="0">
+              <a:buNone/>
+            </a:pPr>
+            <a:r>
+              <a:rPr lang="en-US" sz="2400" dirty="0">
+                <a:solidFill>
+                  <a:srgbClr val="F5FFFA"/>
+                </a:solidFill>
+              </a:rPr>
+              <a:t>Eis o que eu ponho no altar</a:t>
+            </a:r>
+            <a:endParaRPr lang="en-US" sz="2400" dirty="0"/>
+          </a:p>
+          <a:p>
+            <a:pPr algn="ctr" indent="0" marL="0">
+              <a:buNone/>
+            </a:pPr>
+            <a:r>
+              <a:rPr lang="en-US" sz="2400" dirty="0">
+                <a:solidFill>
+                  <a:srgbClr val="F5FFFA"/>
+                </a:solidFill>
+              </a:rPr>
+              <a:t>Toma, Senhor, que ele é Teu</a:t>
+            </a:r>
+            <a:endParaRPr lang="en-US" sz="2400" dirty="0"/>
+          </a:p>
+          <a:p>
+            <a:pPr algn="ctr" indent="0" marL="0">
+              <a:buNone/>
+            </a:pPr>
+            <a:r>
+              <a:rPr lang="en-US" sz="2400" dirty="0">
+                <a:solidFill>
+                  <a:srgbClr val="F5FFFA"/>
+                </a:solidFill>
+              </a:rPr>
+              <a:t>Meu coração não é meu</a:t>
             </a:r>
             <a:endParaRPr lang="en-US" sz="2400" dirty="0"/>
           </a:p>

</xml_diff>